<commit_message>
Fixing bug with b in svm
</commit_message>
<xml_diff>
--- a/C4.Classification_SVM/figs/figures.pptx
+++ b/C4.Classification_SVM/figs/figures.pptx
@@ -288,7 +288,7 @@
           <a:p>
             <a:fld id="{58E1849F-8AA7-3F40-BA11-DAD24B8AAFE8}" type="datetimeFigureOut">
               <a:rPr lang="en-US" smtClean="0"/>
-              <a:t>27/10/16</a:t>
+              <a:t>6/2/18</a:t>
             </a:fld>
             <a:endParaRPr lang="en-US"/>
           </a:p>
@@ -330,7 +330,7 @@
           <a:p>
             <a:fld id="{AE48D2BF-6F2F-424F-9118-421FB07A80A8}" type="slidenum">
               <a:rPr lang="en-US" smtClean="0"/>
-              <a:t>‹#›</a:t>
+              <a:t>‹Nr.›</a:t>
             </a:fld>
             <a:endParaRPr lang="en-US"/>
           </a:p>
@@ -458,7 +458,7 @@
           <a:p>
             <a:fld id="{58E1849F-8AA7-3F40-BA11-DAD24B8AAFE8}" type="datetimeFigureOut">
               <a:rPr lang="en-US" smtClean="0"/>
-              <a:t>27/10/16</a:t>
+              <a:t>6/2/18</a:t>
             </a:fld>
             <a:endParaRPr lang="en-US"/>
           </a:p>
@@ -500,7 +500,7 @@
           <a:p>
             <a:fld id="{AE48D2BF-6F2F-424F-9118-421FB07A80A8}" type="slidenum">
               <a:rPr lang="en-US" smtClean="0"/>
-              <a:t>‹#›</a:t>
+              <a:t>‹Nr.›</a:t>
             </a:fld>
             <a:endParaRPr lang="en-US"/>
           </a:p>
@@ -638,7 +638,7 @@
           <a:p>
             <a:fld id="{58E1849F-8AA7-3F40-BA11-DAD24B8AAFE8}" type="datetimeFigureOut">
               <a:rPr lang="en-US" smtClean="0"/>
-              <a:t>27/10/16</a:t>
+              <a:t>6/2/18</a:t>
             </a:fld>
             <a:endParaRPr lang="en-US"/>
           </a:p>
@@ -680,7 +680,7 @@
           <a:p>
             <a:fld id="{AE48D2BF-6F2F-424F-9118-421FB07A80A8}" type="slidenum">
               <a:rPr lang="en-US" smtClean="0"/>
-              <a:t>‹#›</a:t>
+              <a:t>‹Nr.›</a:t>
             </a:fld>
             <a:endParaRPr lang="en-US"/>
           </a:p>
@@ -808,7 +808,7 @@
           <a:p>
             <a:fld id="{58E1849F-8AA7-3F40-BA11-DAD24B8AAFE8}" type="datetimeFigureOut">
               <a:rPr lang="en-US" smtClean="0"/>
-              <a:t>27/10/16</a:t>
+              <a:t>6/2/18</a:t>
             </a:fld>
             <a:endParaRPr lang="en-US"/>
           </a:p>
@@ -850,7 +850,7 @@
           <a:p>
             <a:fld id="{AE48D2BF-6F2F-424F-9118-421FB07A80A8}" type="slidenum">
               <a:rPr lang="en-US" smtClean="0"/>
-              <a:t>‹#›</a:t>
+              <a:t>‹Nr.›</a:t>
             </a:fld>
             <a:endParaRPr lang="en-US"/>
           </a:p>
@@ -1054,7 +1054,7 @@
           <a:p>
             <a:fld id="{58E1849F-8AA7-3F40-BA11-DAD24B8AAFE8}" type="datetimeFigureOut">
               <a:rPr lang="en-US" smtClean="0"/>
-              <a:t>27/10/16</a:t>
+              <a:t>6/2/18</a:t>
             </a:fld>
             <a:endParaRPr lang="en-US"/>
           </a:p>
@@ -1096,7 +1096,7 @@
           <a:p>
             <a:fld id="{AE48D2BF-6F2F-424F-9118-421FB07A80A8}" type="slidenum">
               <a:rPr lang="en-US" smtClean="0"/>
-              <a:t>‹#›</a:t>
+              <a:t>‹Nr.›</a:t>
             </a:fld>
             <a:endParaRPr lang="en-US"/>
           </a:p>
@@ -1342,7 +1342,7 @@
           <a:p>
             <a:fld id="{58E1849F-8AA7-3F40-BA11-DAD24B8AAFE8}" type="datetimeFigureOut">
               <a:rPr lang="en-US" smtClean="0"/>
-              <a:t>27/10/16</a:t>
+              <a:t>6/2/18</a:t>
             </a:fld>
             <a:endParaRPr lang="en-US"/>
           </a:p>
@@ -1384,7 +1384,7 @@
           <a:p>
             <a:fld id="{AE48D2BF-6F2F-424F-9118-421FB07A80A8}" type="slidenum">
               <a:rPr lang="en-US" smtClean="0"/>
-              <a:t>‹#›</a:t>
+              <a:t>‹Nr.›</a:t>
             </a:fld>
             <a:endParaRPr lang="en-US"/>
           </a:p>
@@ -1764,7 +1764,7 @@
           <a:p>
             <a:fld id="{58E1849F-8AA7-3F40-BA11-DAD24B8AAFE8}" type="datetimeFigureOut">
               <a:rPr lang="en-US" smtClean="0"/>
-              <a:t>27/10/16</a:t>
+              <a:t>6/2/18</a:t>
             </a:fld>
             <a:endParaRPr lang="en-US"/>
           </a:p>
@@ -1806,7 +1806,7 @@
           <a:p>
             <a:fld id="{AE48D2BF-6F2F-424F-9118-421FB07A80A8}" type="slidenum">
               <a:rPr lang="en-US" smtClean="0"/>
-              <a:t>‹#›</a:t>
+              <a:t>‹Nr.›</a:t>
             </a:fld>
             <a:endParaRPr lang="en-US"/>
           </a:p>
@@ -1882,7 +1882,7 @@
           <a:p>
             <a:fld id="{58E1849F-8AA7-3F40-BA11-DAD24B8AAFE8}" type="datetimeFigureOut">
               <a:rPr lang="en-US" smtClean="0"/>
-              <a:t>27/10/16</a:t>
+              <a:t>6/2/18</a:t>
             </a:fld>
             <a:endParaRPr lang="en-US"/>
           </a:p>
@@ -1924,7 +1924,7 @@
           <a:p>
             <a:fld id="{AE48D2BF-6F2F-424F-9118-421FB07A80A8}" type="slidenum">
               <a:rPr lang="en-US" smtClean="0"/>
-              <a:t>‹#›</a:t>
+              <a:t>‹Nr.›</a:t>
             </a:fld>
             <a:endParaRPr lang="en-US"/>
           </a:p>
@@ -1977,7 +1977,7 @@
           <a:p>
             <a:fld id="{58E1849F-8AA7-3F40-BA11-DAD24B8AAFE8}" type="datetimeFigureOut">
               <a:rPr lang="en-US" smtClean="0"/>
-              <a:t>27/10/16</a:t>
+              <a:t>6/2/18</a:t>
             </a:fld>
             <a:endParaRPr lang="en-US"/>
           </a:p>
@@ -2019,7 +2019,7 @@
           <a:p>
             <a:fld id="{AE48D2BF-6F2F-424F-9118-421FB07A80A8}" type="slidenum">
               <a:rPr lang="en-US" smtClean="0"/>
-              <a:t>‹#›</a:t>
+              <a:t>‹Nr.›</a:t>
             </a:fld>
             <a:endParaRPr lang="en-US"/>
           </a:p>
@@ -2254,7 +2254,7 @@
           <a:p>
             <a:fld id="{58E1849F-8AA7-3F40-BA11-DAD24B8AAFE8}" type="datetimeFigureOut">
               <a:rPr lang="en-US" smtClean="0"/>
-              <a:t>27/10/16</a:t>
+              <a:t>6/2/18</a:t>
             </a:fld>
             <a:endParaRPr lang="en-US"/>
           </a:p>
@@ -2296,7 +2296,7 @@
           <a:p>
             <a:fld id="{AE48D2BF-6F2F-424F-9118-421FB07A80A8}" type="slidenum">
               <a:rPr lang="en-US" smtClean="0"/>
-              <a:t>‹#›</a:t>
+              <a:t>‹Nr.›</a:t>
             </a:fld>
             <a:endParaRPr lang="en-US"/>
           </a:p>
@@ -2507,7 +2507,7 @@
           <a:p>
             <a:fld id="{58E1849F-8AA7-3F40-BA11-DAD24B8AAFE8}" type="datetimeFigureOut">
               <a:rPr lang="en-US" smtClean="0"/>
-              <a:t>27/10/16</a:t>
+              <a:t>6/2/18</a:t>
             </a:fld>
             <a:endParaRPr lang="en-US"/>
           </a:p>
@@ -2549,7 +2549,7 @@
           <a:p>
             <a:fld id="{AE48D2BF-6F2F-424F-9118-421FB07A80A8}" type="slidenum">
               <a:rPr lang="en-US" smtClean="0"/>
-              <a:t>‹#›</a:t>
+              <a:t>‹Nr.›</a:t>
             </a:fld>
             <a:endParaRPr lang="en-US"/>
           </a:p>
@@ -2720,7 +2720,7 @@
           <a:p>
             <a:fld id="{58E1849F-8AA7-3F40-BA11-DAD24B8AAFE8}" type="datetimeFigureOut">
               <a:rPr lang="en-US" smtClean="0"/>
-              <a:t>27/10/16</a:t>
+              <a:t>6/2/18</a:t>
             </a:fld>
             <a:endParaRPr lang="en-US"/>
           </a:p>
@@ -2798,7 +2798,7 @@
           <a:p>
             <a:fld id="{AE48D2BF-6F2F-424F-9118-421FB07A80A8}" type="slidenum">
               <a:rPr lang="en-US" smtClean="0"/>
-              <a:t>‹#›</a:t>
+              <a:t>‹Nr.›</a:t>
             </a:fld>
             <a:endParaRPr lang="en-US"/>
           </a:p>
@@ -3104,9 +3104,9 @@
         <p:grpSpPr>
           <a:xfrm>
             <a:off x="502843" y="1214592"/>
-            <a:ext cx="5383007" cy="2686470"/>
+            <a:ext cx="5276383" cy="2686470"/>
             <a:chOff x="502843" y="1214592"/>
-            <a:chExt cx="5383007" cy="2686470"/>
+            <a:chExt cx="5276383" cy="2686470"/>
           </a:xfrm>
         </p:grpSpPr>
         <p:pic>
@@ -3332,8 +3332,8 @@
           </p:nvSpPr>
           <p:spPr>
             <a:xfrm rot="19440000">
-              <a:off x="979079" y="2519888"/>
-              <a:ext cx="813043" cy="369332"/>
+              <a:off x="998353" y="2519888"/>
+              <a:ext cx="774496" cy="369332"/>
             </a:xfrm>
             <a:prstGeom prst="rect">
               <a:avLst/>
@@ -3347,7 +3347,7 @@
             <a:lstStyle/>
             <a:p>
               <a:r>
-                <a:rPr lang="en-US" b="1" dirty="0">
+                <a:rPr lang="en-US" b="1" dirty="0" smtClean="0">
                   <a:latin typeface="Times New Roman"/>
                   <a:cs typeface="Times New Roman"/>
                 </a:rPr>
@@ -3365,7 +3365,7 @@
                   <a:latin typeface="Times New Roman"/>
                   <a:cs typeface="Times New Roman"/>
                 </a:rPr>
-                <a:t> – </a:t>
+                <a:t> - </a:t>
               </a:r>
               <a:r>
                 <a:rPr lang="en-US" b="1" dirty="0" smtClean="0">
@@ -3397,7 +3397,7 @@
           <p:spPr>
             <a:xfrm>
               <a:off x="4521112" y="1506952"/>
-              <a:ext cx="1276624" cy="369332"/>
+              <a:ext cx="1223312" cy="369332"/>
             </a:xfrm>
             <a:prstGeom prst="rect">
               <a:avLst/>
@@ -3411,18 +3411,18 @@
             <a:lstStyle/>
             <a:p>
               <a:r>
-                <a:rPr lang="en-US" b="1" dirty="0" smtClean="0">
+                <a:rPr lang="en-US" b="1" dirty="0" err="1" smtClean="0">
                   <a:latin typeface="Times New Roman"/>
                   <a:cs typeface="Times New Roman"/>
                 </a:rPr>
                 <a:t>w</a:t>
               </a:r>
               <a:r>
-                <a:rPr lang="en-US" baseline="30000" dirty="0" smtClean="0"/>
+                <a:rPr lang="en-US" baseline="30000" dirty="0" err="1" smtClean="0"/>
                 <a:t>T</a:t>
               </a:r>
               <a:r>
-                <a:rPr lang="en-US" b="1" dirty="0" smtClean="0">
+                <a:rPr lang="en-US" b="1" dirty="0" err="1" smtClean="0">
                   <a:latin typeface="Times New Roman"/>
                   <a:cs typeface="Times New Roman"/>
                 </a:rPr>
@@ -3433,7 +3433,28 @@
                   <a:latin typeface="Times New Roman"/>
                   <a:cs typeface="Times New Roman"/>
                 </a:rPr>
-                <a:t> + b = 1</a:t>
+                <a:t> </a:t>
+              </a:r>
+              <a:r>
+                <a:rPr lang="en-US" dirty="0" smtClean="0">
+                  <a:latin typeface="Times New Roman"/>
+                  <a:cs typeface="Times New Roman"/>
+                </a:rPr>
+                <a:t>- </a:t>
+              </a:r>
+              <a:r>
+                <a:rPr lang="en-US" i="1" dirty="0" smtClean="0">
+                  <a:latin typeface="Times New Roman"/>
+                  <a:cs typeface="Times New Roman"/>
+                </a:rPr>
+                <a:t>b</a:t>
+              </a:r>
+              <a:r>
+                <a:rPr lang="en-US" dirty="0" smtClean="0">
+                  <a:latin typeface="Times New Roman"/>
+                  <a:cs typeface="Times New Roman"/>
+                </a:rPr>
+                <a:t> = 1</a:t>
               </a:r>
               <a:endParaRPr lang="en-US" dirty="0">
                 <a:latin typeface="Times New Roman"/>
@@ -3451,7 +3472,7 @@
           <p:spPr>
             <a:xfrm>
               <a:off x="4479045" y="2171089"/>
-              <a:ext cx="1406805" cy="369332"/>
+              <a:ext cx="1300181" cy="369332"/>
             </a:xfrm>
             <a:prstGeom prst="rect">
               <a:avLst/>
@@ -3465,18 +3486,18 @@
             <a:lstStyle/>
             <a:p>
               <a:r>
-                <a:rPr lang="en-US" b="1" dirty="0" smtClean="0">
+                <a:rPr lang="en-US" b="1" dirty="0" err="1" smtClean="0">
                   <a:latin typeface="Times New Roman"/>
                   <a:cs typeface="Times New Roman"/>
                 </a:rPr>
                 <a:t>w</a:t>
               </a:r>
               <a:r>
-                <a:rPr lang="en-US" baseline="30000" dirty="0" smtClean="0"/>
+                <a:rPr lang="en-US" baseline="30000" dirty="0" err="1" smtClean="0"/>
                 <a:t>T</a:t>
               </a:r>
               <a:r>
-                <a:rPr lang="en-US" b="1" dirty="0" smtClean="0">
+                <a:rPr lang="en-US" b="1" dirty="0" err="1" smtClean="0">
                   <a:latin typeface="Times New Roman"/>
                   <a:cs typeface="Times New Roman"/>
                 </a:rPr>
@@ -3487,7 +3508,42 @@
                   <a:latin typeface="Times New Roman"/>
                   <a:cs typeface="Times New Roman"/>
                 </a:rPr>
-                <a:t> + b = −1</a:t>
+                <a:t> </a:t>
+              </a:r>
+              <a:r>
+                <a:rPr lang="en-US" dirty="0" smtClean="0">
+                  <a:latin typeface="Times New Roman"/>
+                  <a:cs typeface="Times New Roman"/>
+                </a:rPr>
+                <a:t>- </a:t>
+              </a:r>
+              <a:r>
+                <a:rPr lang="en-US" i="1" dirty="0" smtClean="0">
+                  <a:latin typeface="Times New Roman"/>
+                  <a:cs typeface="Times New Roman"/>
+                </a:rPr>
+                <a:t>b</a:t>
+              </a:r>
+              <a:r>
+                <a:rPr lang="en-US" dirty="0" smtClean="0">
+                  <a:latin typeface="Times New Roman"/>
+                  <a:cs typeface="Times New Roman"/>
+                </a:rPr>
+                <a:t> = </a:t>
+              </a:r>
+              <a:r>
+                <a:rPr lang="en-US" dirty="0" smtClean="0">
+                  <a:latin typeface="Times New Roman"/>
+                  <a:cs typeface="Times New Roman"/>
+                </a:rPr>
+                <a:t>-</a:t>
+              </a:r>
+              <a:r>
+                <a:rPr lang="en-US" dirty="0" smtClean="0">
+                  <a:latin typeface="Times New Roman"/>
+                  <a:cs typeface="Times New Roman"/>
+                </a:rPr>
+                <a:t>1 </a:t>
               </a:r>
               <a:endParaRPr lang="en-US" dirty="0">
                 <a:latin typeface="Times New Roman"/>

</xml_diff>